<commit_message>
Updated presentation, Blocking data call working
added some slides to the presentation to talk about, blocking data calls
are now working. need to do testing and get the blocking calls working
on the board.
</commit_message>
<xml_diff>
--- a/PhaseII/Presentation/COMPSYS701-phase2.pptx
+++ b/PhaseII/Presentation/COMPSYS701-phase2.pptx
@@ -13,7 +13,9 @@
     <p:sldId id="261" r:id="rId7"/>
     <p:sldId id="262" r:id="rId8"/>
     <p:sldId id="263" r:id="rId9"/>
-    <p:sldId id="264" r:id="rId10"/>
+    <p:sldId id="265" r:id="rId10"/>
+    <p:sldId id="266" r:id="rId11"/>
+    <p:sldId id="264" r:id="rId12"/>
   </p:sldIdLst>
   <p:sldSz cx="9144000" cy="6858000" type="screen4x3"/>
   <p:notesSz cx="6858000" cy="9144000"/>
@@ -3918,7 +3920,7 @@
 </p:sld>
 </file>
 
-<file path=ppt/slides/slide2.xml><?xml version="1.0" encoding="utf-8"?>
+<file path=ppt/slides/slide10.xml><?xml version="1.0" encoding="utf-8"?>
 <p:sld xmlns:a="http://schemas.openxmlformats.org/drawingml/2006/main" xmlns:r="http://schemas.openxmlformats.org/officeDocument/2006/relationships" xmlns:p="http://schemas.openxmlformats.org/presentationml/2006/main">
   <p:cSld>
     <p:spTree>
@@ -3954,7 +3956,7 @@
           <a:p>
             <a:r>
               <a:rPr lang="en-US" dirty="0" smtClean="0"/>
-              <a:t>Differences between Phases 1 &amp;2</a:t>
+              <a:t>Non-Blocking Future Development</a:t>
             </a:r>
             <a:endParaRPr lang="en-NZ" dirty="0"/>
           </a:p>
@@ -3975,14 +3977,48 @@
           <a:bodyPr/>
           <a:lstStyle/>
           <a:p>
-            <a:endParaRPr lang="en-NZ" dirty="0"/>
+            <a:r>
+              <a:rPr lang="en-US" dirty="0" smtClean="0"/>
+              <a:t>Adding the FIFO memory to communicate between the </a:t>
+            </a:r>
+            <a:r>
+              <a:rPr lang="en-US" dirty="0" err="1" smtClean="0"/>
+              <a:t>ReCOP</a:t>
+            </a:r>
+            <a:r>
+              <a:rPr lang="en-US" dirty="0" smtClean="0"/>
+              <a:t> and the JOP</a:t>
+            </a:r>
+          </a:p>
+          <a:p>
+            <a:endParaRPr lang="en-US" dirty="0"/>
+          </a:p>
+          <a:p>
+            <a:r>
+              <a:rPr lang="en-US" dirty="0" smtClean="0"/>
+              <a:t>Changing Control Unit to allow for correct operation</a:t>
+            </a:r>
+          </a:p>
+          <a:p>
+            <a:endParaRPr lang="en-US" dirty="0"/>
+          </a:p>
+          <a:p>
+            <a:r>
+              <a:rPr lang="en-US" dirty="0" smtClean="0"/>
+              <a:t>Writing an adequate </a:t>
+            </a:r>
+            <a:r>
+              <a:rPr lang="en-US" smtClean="0"/>
+              <a:t>testbench</a:t>
+            </a:r>
+            <a:endParaRPr lang="en-NZ"/>
           </a:p>
         </p:txBody>
       </p:sp>
     </p:spTree>
     <p:extLst>
       <p:ext uri="{BB962C8B-B14F-4D97-AF65-F5344CB8AC3E}">
-        <p14:creationId xmlns:p14="http://schemas.microsoft.com/office/powerpoint/2010/main" val="1916433675"/>
+        <p14:creationId xmlns:p14="http://schemas.microsoft.com/office/powerpoint/2010/main" val="560646838"/>
       </p:ext>
     </p:extLst>
   </p:cSld>
@@ -3992,562 +4028,7 @@
 </p:sld>
 </file>
 
-<file path=ppt/slides/slide3.xml><?xml version="1.0" encoding="utf-8"?>
-<p:sld xmlns:a="http://schemas.openxmlformats.org/drawingml/2006/main" xmlns:r="http://schemas.openxmlformats.org/officeDocument/2006/relationships" xmlns:p="http://schemas.openxmlformats.org/presentationml/2006/main">
-  <p:cSld>
-    <p:spTree>
-      <p:nvGrpSpPr>
-        <p:cNvPr id="1" name=""/>
-        <p:cNvGrpSpPr/>
-        <p:nvPr/>
-      </p:nvGrpSpPr>
-      <p:grpSpPr>
-        <a:xfrm>
-          <a:off x="0" y="0"/>
-          <a:ext cx="0" cy="0"/>
-          <a:chOff x="0" y="0"/>
-          <a:chExt cx="0" cy="0"/>
-        </a:xfrm>
-      </p:grpSpPr>
-      <p:sp>
-        <p:nvSpPr>
-          <p:cNvPr id="2" name="Title 1"/>
-          <p:cNvSpPr>
-            <a:spLocks noGrp="1"/>
-          </p:cNvSpPr>
-          <p:nvPr>
-            <p:ph type="title"/>
-          </p:nvPr>
-        </p:nvSpPr>
-        <p:spPr/>
-        <p:txBody>
-          <a:bodyPr>
-            <a:normAutofit fontScale="90000"/>
-          </a:bodyPr>
-          <a:lstStyle/>
-          <a:p>
-            <a:r>
-              <a:rPr lang="en-US" dirty="0" smtClean="0"/>
-              <a:t>Differences between </a:t>
-            </a:r>
-            <a:r>
-              <a:rPr lang="en-US" dirty="0" err="1" smtClean="0"/>
-              <a:t>SystemC</a:t>
-            </a:r>
-            <a:r>
-              <a:rPr lang="en-US" dirty="0" smtClean="0"/>
-              <a:t> and VHDL</a:t>
-            </a:r>
-            <a:endParaRPr lang="en-NZ" dirty="0"/>
-          </a:p>
-        </p:txBody>
-      </p:sp>
-      <p:sp>
-        <p:nvSpPr>
-          <p:cNvPr id="3" name="Content Placeholder 2"/>
-          <p:cNvSpPr>
-            <a:spLocks noGrp="1"/>
-          </p:cNvSpPr>
-          <p:nvPr>
-            <p:ph idx="1"/>
-          </p:nvPr>
-        </p:nvSpPr>
-        <p:spPr/>
-        <p:txBody>
-          <a:bodyPr/>
-          <a:lstStyle/>
-          <a:p>
-            <a:endParaRPr lang="en-NZ" dirty="0"/>
-          </a:p>
-        </p:txBody>
-      </p:sp>
-    </p:spTree>
-    <p:extLst>
-      <p:ext uri="{BB962C8B-B14F-4D97-AF65-F5344CB8AC3E}">
-        <p14:creationId xmlns:p14="http://schemas.microsoft.com/office/powerpoint/2010/main" val="3753341240"/>
-      </p:ext>
-    </p:extLst>
-  </p:cSld>
-  <p:clrMapOvr>
-    <a:masterClrMapping/>
-  </p:clrMapOvr>
-</p:sld>
-</file>
-
-<file path=ppt/slides/slide4.xml><?xml version="1.0" encoding="utf-8"?>
-<p:sld xmlns:a="http://schemas.openxmlformats.org/drawingml/2006/main" xmlns:r="http://schemas.openxmlformats.org/officeDocument/2006/relationships" xmlns:p="http://schemas.openxmlformats.org/presentationml/2006/main">
-  <p:cSld>
-    <p:spTree>
-      <p:nvGrpSpPr>
-        <p:cNvPr id="1" name=""/>
-        <p:cNvGrpSpPr/>
-        <p:nvPr/>
-      </p:nvGrpSpPr>
-      <p:grpSpPr>
-        <a:xfrm>
-          <a:off x="0" y="0"/>
-          <a:ext cx="0" cy="0"/>
-          <a:chOff x="0" y="0"/>
-          <a:chExt cx="0" cy="0"/>
-        </a:xfrm>
-      </p:grpSpPr>
-      <p:sp>
-        <p:nvSpPr>
-          <p:cNvPr id="2" name="Title 1"/>
-          <p:cNvSpPr>
-            <a:spLocks noGrp="1"/>
-          </p:cNvSpPr>
-          <p:nvPr>
-            <p:ph type="title"/>
-          </p:nvPr>
-        </p:nvSpPr>
-        <p:spPr/>
-        <p:txBody>
-          <a:bodyPr/>
-          <a:lstStyle/>
-          <a:p>
-            <a:r>
-              <a:rPr lang="en-US" dirty="0" err="1" smtClean="0"/>
-              <a:t>Recop</a:t>
-            </a:r>
-            <a:r>
-              <a:rPr lang="en-US" dirty="0" smtClean="0"/>
-              <a:t> Capabilities</a:t>
-            </a:r>
-            <a:endParaRPr lang="en-NZ" dirty="0"/>
-          </a:p>
-        </p:txBody>
-      </p:sp>
-      <p:sp>
-        <p:nvSpPr>
-          <p:cNvPr id="3" name="Content Placeholder 2"/>
-          <p:cNvSpPr>
-            <a:spLocks noGrp="1"/>
-          </p:cNvSpPr>
-          <p:nvPr>
-            <p:ph idx="1"/>
-          </p:nvPr>
-        </p:nvSpPr>
-        <p:spPr/>
-        <p:txBody>
-          <a:bodyPr/>
-          <a:lstStyle/>
-          <a:p>
-            <a:r>
-              <a:rPr lang="en-US" dirty="0" smtClean="0"/>
-              <a:t>Instructions relating to the ring counter</a:t>
-            </a:r>
-          </a:p>
-          <a:p>
-            <a:pPr lvl="1"/>
-            <a:r>
-              <a:rPr lang="en-US" dirty="0" smtClean="0"/>
-              <a:t>Load, ALU operations, Jump </a:t>
-            </a:r>
-            <a:r>
-              <a:rPr lang="en-US" dirty="0" err="1" smtClean="0"/>
-              <a:t>etc</a:t>
-            </a:r>
-            <a:endParaRPr lang="en-US" dirty="0" smtClean="0"/>
-          </a:p>
-          <a:p>
-            <a:endParaRPr lang="en-NZ" dirty="0"/>
-          </a:p>
-        </p:txBody>
-      </p:sp>
-    </p:spTree>
-    <p:extLst>
-      <p:ext uri="{BB962C8B-B14F-4D97-AF65-F5344CB8AC3E}">
-        <p14:creationId xmlns:p14="http://schemas.microsoft.com/office/powerpoint/2010/main" val="2622890681"/>
-      </p:ext>
-    </p:extLst>
-  </p:cSld>
-  <p:clrMapOvr>
-    <a:masterClrMapping/>
-  </p:clrMapOvr>
-</p:sld>
-</file>
-
-<file path=ppt/slides/slide5.xml><?xml version="1.0" encoding="utf-8"?>
-<p:sld xmlns:a="http://schemas.openxmlformats.org/drawingml/2006/main" xmlns:r="http://schemas.openxmlformats.org/officeDocument/2006/relationships" xmlns:p="http://schemas.openxmlformats.org/presentationml/2006/main">
-  <p:cSld>
-    <p:spTree>
-      <p:nvGrpSpPr>
-        <p:cNvPr id="1" name=""/>
-        <p:cNvGrpSpPr/>
-        <p:nvPr/>
-      </p:nvGrpSpPr>
-      <p:grpSpPr>
-        <a:xfrm>
-          <a:off x="0" y="0"/>
-          <a:ext cx="0" cy="0"/>
-          <a:chOff x="0" y="0"/>
-          <a:chExt cx="0" cy="0"/>
-        </a:xfrm>
-      </p:grpSpPr>
-      <p:sp>
-        <p:nvSpPr>
-          <p:cNvPr id="2" name="Title 1"/>
-          <p:cNvSpPr>
-            <a:spLocks noGrp="1"/>
-          </p:cNvSpPr>
-          <p:nvPr>
-            <p:ph type="title"/>
-          </p:nvPr>
-        </p:nvSpPr>
-        <p:spPr/>
-        <p:txBody>
-          <a:bodyPr>
-            <a:normAutofit/>
-          </a:bodyPr>
-          <a:lstStyle/>
-          <a:p>
-            <a:r>
-              <a:rPr lang="en-US" dirty="0" err="1" smtClean="0"/>
-              <a:t>Recop</a:t>
-            </a:r>
-            <a:r>
-              <a:rPr lang="en-US" dirty="0" smtClean="0"/>
-              <a:t> </a:t>
-            </a:r>
-            <a:r>
-              <a:rPr lang="en-US" dirty="0" err="1" smtClean="0"/>
-              <a:t>Incapabilities</a:t>
-            </a:r>
-            <a:endParaRPr lang="en-NZ" dirty="0"/>
-          </a:p>
-        </p:txBody>
-      </p:sp>
-      <p:sp>
-        <p:nvSpPr>
-          <p:cNvPr id="3" name="Content Placeholder 2"/>
-          <p:cNvSpPr>
-            <a:spLocks noGrp="1"/>
-          </p:cNvSpPr>
-          <p:nvPr>
-            <p:ph idx="1"/>
-          </p:nvPr>
-        </p:nvSpPr>
-        <p:spPr/>
-        <p:txBody>
-          <a:bodyPr/>
-          <a:lstStyle/>
-          <a:p>
-            <a:r>
-              <a:rPr lang="en-US" dirty="0" smtClean="0"/>
-              <a:t>Unable to complete data calls</a:t>
-            </a:r>
-          </a:p>
-          <a:p>
-            <a:pPr lvl="1"/>
-            <a:r>
-              <a:rPr lang="en-US" dirty="0" smtClean="0"/>
-              <a:t>Blocking working to a certain degree</a:t>
-            </a:r>
-          </a:p>
-          <a:p>
-            <a:pPr lvl="1"/>
-            <a:r>
-              <a:rPr lang="en-US" dirty="0" smtClean="0"/>
-              <a:t>Non Blocking not quite implemented</a:t>
-            </a:r>
-            <a:endParaRPr lang="en-NZ" dirty="0"/>
-          </a:p>
-        </p:txBody>
-      </p:sp>
-    </p:spTree>
-    <p:extLst>
-      <p:ext uri="{BB962C8B-B14F-4D97-AF65-F5344CB8AC3E}">
-        <p14:creationId xmlns:p14="http://schemas.microsoft.com/office/powerpoint/2010/main" val="2060475138"/>
-      </p:ext>
-    </p:extLst>
-  </p:cSld>
-  <p:clrMapOvr>
-    <a:masterClrMapping/>
-  </p:clrMapOvr>
-</p:sld>
-</file>
-
-<file path=ppt/slides/slide6.xml><?xml version="1.0" encoding="utf-8"?>
-<p:sld xmlns:a="http://schemas.openxmlformats.org/drawingml/2006/main" xmlns:r="http://schemas.openxmlformats.org/officeDocument/2006/relationships" xmlns:p="http://schemas.openxmlformats.org/presentationml/2006/main">
-  <p:cSld>
-    <p:spTree>
-      <p:nvGrpSpPr>
-        <p:cNvPr id="1" name=""/>
-        <p:cNvGrpSpPr/>
-        <p:nvPr/>
-      </p:nvGrpSpPr>
-      <p:grpSpPr>
-        <a:xfrm>
-          <a:off x="0" y="0"/>
-          <a:ext cx="0" cy="0"/>
-          <a:chOff x="0" y="0"/>
-          <a:chExt cx="0" cy="0"/>
-        </a:xfrm>
-      </p:grpSpPr>
-      <p:sp>
-        <p:nvSpPr>
-          <p:cNvPr id="2" name="Title 1"/>
-          <p:cNvSpPr>
-            <a:spLocks noGrp="1"/>
-          </p:cNvSpPr>
-          <p:nvPr>
-            <p:ph type="title"/>
-          </p:nvPr>
-        </p:nvSpPr>
-        <p:spPr/>
-        <p:txBody>
-          <a:bodyPr/>
-          <a:lstStyle/>
-          <a:p>
-            <a:r>
-              <a:rPr lang="en-US" dirty="0" smtClean="0"/>
-              <a:t>Ring Counter Simulation Results</a:t>
-            </a:r>
-            <a:endParaRPr lang="en-NZ" dirty="0"/>
-          </a:p>
-        </p:txBody>
-      </p:sp>
-      <p:sp>
-        <p:nvSpPr>
-          <p:cNvPr id="3" name="Content Placeholder 2"/>
-          <p:cNvSpPr>
-            <a:spLocks noGrp="1"/>
-          </p:cNvSpPr>
-          <p:nvPr>
-            <p:ph idx="1"/>
-          </p:nvPr>
-        </p:nvSpPr>
-        <p:spPr/>
-        <p:txBody>
-          <a:bodyPr/>
-          <a:lstStyle/>
-          <a:p>
-            <a:endParaRPr lang="en-NZ"/>
-          </a:p>
-        </p:txBody>
-      </p:sp>
-    </p:spTree>
-    <p:extLst>
-      <p:ext uri="{BB962C8B-B14F-4D97-AF65-F5344CB8AC3E}">
-        <p14:creationId xmlns:p14="http://schemas.microsoft.com/office/powerpoint/2010/main" val="2905183933"/>
-      </p:ext>
-    </p:extLst>
-  </p:cSld>
-  <p:clrMapOvr>
-    <a:masterClrMapping/>
-  </p:clrMapOvr>
-</p:sld>
-</file>
-
-<file path=ppt/slides/slide7.xml><?xml version="1.0" encoding="utf-8"?>
-<p:sld xmlns:a="http://schemas.openxmlformats.org/drawingml/2006/main" xmlns:r="http://schemas.openxmlformats.org/officeDocument/2006/relationships" xmlns:p="http://schemas.openxmlformats.org/presentationml/2006/main">
-  <p:cSld>
-    <p:spTree>
-      <p:nvGrpSpPr>
-        <p:cNvPr id="1" name=""/>
-        <p:cNvGrpSpPr/>
-        <p:nvPr/>
-      </p:nvGrpSpPr>
-      <p:grpSpPr>
-        <a:xfrm>
-          <a:off x="0" y="0"/>
-          <a:ext cx="0" cy="0"/>
-          <a:chOff x="0" y="0"/>
-          <a:chExt cx="0" cy="0"/>
-        </a:xfrm>
-      </p:grpSpPr>
-      <p:sp>
-        <p:nvSpPr>
-          <p:cNvPr id="2" name="Title 1"/>
-          <p:cNvSpPr>
-            <a:spLocks noGrp="1"/>
-          </p:cNvSpPr>
-          <p:nvPr>
-            <p:ph type="title"/>
-          </p:nvPr>
-        </p:nvSpPr>
-        <p:spPr/>
-        <p:txBody>
-          <a:bodyPr>
-            <a:normAutofit fontScale="90000"/>
-          </a:bodyPr>
-          <a:lstStyle/>
-          <a:p>
-            <a:r>
-              <a:rPr lang="en-US" dirty="0" smtClean="0"/>
-              <a:t>Ring Counter Synthesis Information</a:t>
-            </a:r>
-            <a:endParaRPr lang="en-NZ" dirty="0"/>
-          </a:p>
-        </p:txBody>
-      </p:sp>
-      <p:sp>
-        <p:nvSpPr>
-          <p:cNvPr id="3" name="Content Placeholder 2"/>
-          <p:cNvSpPr>
-            <a:spLocks noGrp="1"/>
-          </p:cNvSpPr>
-          <p:nvPr>
-            <p:ph idx="1"/>
-          </p:nvPr>
-        </p:nvSpPr>
-        <p:spPr/>
-        <p:txBody>
-          <a:bodyPr/>
-          <a:lstStyle/>
-          <a:p>
-            <a:r>
-              <a:rPr lang="en-US" dirty="0" smtClean="0"/>
-              <a:t>Resource Usage Count</a:t>
-            </a:r>
-          </a:p>
-          <a:p>
-            <a:pPr lvl="1"/>
-            <a:r>
-              <a:rPr lang="en-US" dirty="0" smtClean="0"/>
-              <a:t>LEs</a:t>
-            </a:r>
-          </a:p>
-          <a:p>
-            <a:pPr lvl="2"/>
-            <a:r>
-              <a:rPr lang="en-US" dirty="0" smtClean="0"/>
-              <a:t>852</a:t>
-            </a:r>
-            <a:endParaRPr lang="en-NZ" dirty="0" smtClean="0"/>
-          </a:p>
-          <a:p>
-            <a:r>
-              <a:rPr lang="en-US" dirty="0" smtClean="0"/>
-              <a:t>Maximum Operating Frequency</a:t>
-            </a:r>
-          </a:p>
-        </p:txBody>
-      </p:sp>
-    </p:spTree>
-    <p:extLst>
-      <p:ext uri="{BB962C8B-B14F-4D97-AF65-F5344CB8AC3E}">
-        <p14:creationId xmlns:p14="http://schemas.microsoft.com/office/powerpoint/2010/main" val="3822034495"/>
-      </p:ext>
-    </p:extLst>
-  </p:cSld>
-  <p:clrMapOvr>
-    <a:masterClrMapping/>
-  </p:clrMapOvr>
-</p:sld>
-</file>
-
-<file path=ppt/slides/slide8.xml><?xml version="1.0" encoding="utf-8"?>
-<p:sld xmlns:a="http://schemas.openxmlformats.org/drawingml/2006/main" xmlns:r="http://schemas.openxmlformats.org/officeDocument/2006/relationships" xmlns:p="http://schemas.openxmlformats.org/presentationml/2006/main">
-  <p:cSld>
-    <p:spTree>
-      <p:nvGrpSpPr>
-        <p:cNvPr id="1" name=""/>
-        <p:cNvGrpSpPr/>
-        <p:nvPr/>
-      </p:nvGrpSpPr>
-      <p:grpSpPr>
-        <a:xfrm>
-          <a:off x="0" y="0"/>
-          <a:ext cx="0" cy="0"/>
-          <a:chOff x="0" y="0"/>
-          <a:chExt cx="0" cy="0"/>
-        </a:xfrm>
-      </p:grpSpPr>
-      <p:sp>
-        <p:nvSpPr>
-          <p:cNvPr id="2" name="Title 1"/>
-          <p:cNvSpPr>
-            <a:spLocks noGrp="1"/>
-          </p:cNvSpPr>
-          <p:nvPr>
-            <p:ph type="title"/>
-          </p:nvPr>
-        </p:nvSpPr>
-        <p:spPr/>
-        <p:txBody>
-          <a:bodyPr/>
-          <a:lstStyle/>
-          <a:p>
-            <a:r>
-              <a:rPr lang="en-US" dirty="0" smtClean="0"/>
-              <a:t>Blocking Data Call Simulation</a:t>
-            </a:r>
-            <a:endParaRPr lang="en-NZ" dirty="0"/>
-          </a:p>
-        </p:txBody>
-      </p:sp>
-      <p:pic>
-        <p:nvPicPr>
-          <p:cNvPr id="1027" name="Picture 3"/>
-          <p:cNvPicPr>
-            <a:picLocks noGrp="1" noChangeAspect="1" noChangeArrowheads="1"/>
-          </p:cNvPicPr>
-          <p:nvPr>
-            <p:ph idx="1"/>
-          </p:nvPr>
-        </p:nvPicPr>
-        <p:blipFill>
-          <a:blip r:embed="rId2">
-            <a:extLst>
-              <a:ext uri="{28A0092B-C50C-407E-A947-70E740481C1C}">
-                <a14:useLocalDpi xmlns:a14="http://schemas.microsoft.com/office/drawing/2010/main" val="0"/>
-              </a:ext>
-            </a:extLst>
-          </a:blip>
-          <a:srcRect/>
-          <a:stretch>
-            <a:fillRect/>
-          </a:stretch>
-        </p:blipFill>
-        <p:spPr bwMode="auto">
-          <a:xfrm>
-            <a:off x="457200" y="2456357"/>
-            <a:ext cx="8229600" cy="3347049"/>
-          </a:xfrm>
-          <a:prstGeom prst="rect">
-            <a:avLst/>
-          </a:prstGeom>
-          <a:noFill/>
-          <a:ln>
-            <a:noFill/>
-          </a:ln>
-          <a:extLst>
-            <a:ext uri="{909E8E84-426E-40DD-AFC4-6F175D3DCCD1}">
-              <a14:hiddenFill xmlns:a14="http://schemas.microsoft.com/office/drawing/2010/main">
-                <a:solidFill>
-                  <a:schemeClr val="accent1"/>
-                </a:solidFill>
-              </a14:hiddenFill>
-            </a:ext>
-            <a:ext uri="{91240B29-F687-4F45-9708-019B960494DF}">
-              <a14:hiddenLine xmlns:a14="http://schemas.microsoft.com/office/drawing/2010/main" w="9525">
-                <a:solidFill>
-                  <a:schemeClr val="tx1"/>
-                </a:solidFill>
-                <a:miter lim="800000"/>
-                <a:headEnd/>
-                <a:tailEnd/>
-              </a14:hiddenLine>
-            </a:ext>
-          </a:extLst>
-        </p:spPr>
-      </p:pic>
-    </p:spTree>
-    <p:extLst>
-      <p:ext uri="{BB962C8B-B14F-4D97-AF65-F5344CB8AC3E}">
-        <p14:creationId xmlns:p14="http://schemas.microsoft.com/office/powerpoint/2010/main" val="1426433349"/>
-      </p:ext>
-    </p:extLst>
-  </p:cSld>
-  <p:clrMapOvr>
-    <a:masterClrMapping/>
-  </p:clrMapOvr>
-</p:sld>
-</file>
-
-<file path=ppt/slides/slide9.xml><?xml version="1.0" encoding="utf-8"?>
+<file path=ppt/slides/slide11.xml><?xml version="1.0" encoding="utf-8"?>
 <p:sld xmlns:a="http://schemas.openxmlformats.org/drawingml/2006/main" xmlns:r="http://schemas.openxmlformats.org/officeDocument/2006/relationships" xmlns:p="http://schemas.openxmlformats.org/presentationml/2006/main">
   <p:cSld>
     <p:spTree>
@@ -4825,6 +4306,749 @@
     <p:extLst>
       <p:ext uri="{BB962C8B-B14F-4D97-AF65-F5344CB8AC3E}">
         <p14:creationId xmlns:p14="http://schemas.microsoft.com/office/powerpoint/2010/main" val="4253640635"/>
+      </p:ext>
+    </p:extLst>
+  </p:cSld>
+  <p:clrMapOvr>
+    <a:masterClrMapping/>
+  </p:clrMapOvr>
+  <p:timing>
+    <p:tnLst>
+      <p:par>
+        <p:cTn id="1" dur="indefinite" restart="never" nodeType="tmRoot"/>
+      </p:par>
+    </p:tnLst>
+  </p:timing>
+</p:sld>
+</file>
+
+<file path=ppt/slides/slide2.xml><?xml version="1.0" encoding="utf-8"?>
+<p:sld xmlns:a="http://schemas.openxmlformats.org/drawingml/2006/main" xmlns:r="http://schemas.openxmlformats.org/officeDocument/2006/relationships" xmlns:p="http://schemas.openxmlformats.org/presentationml/2006/main">
+  <p:cSld>
+    <p:spTree>
+      <p:nvGrpSpPr>
+        <p:cNvPr id="1" name=""/>
+        <p:cNvGrpSpPr/>
+        <p:nvPr/>
+      </p:nvGrpSpPr>
+      <p:grpSpPr>
+        <a:xfrm>
+          <a:off x="0" y="0"/>
+          <a:ext cx="0" cy="0"/>
+          <a:chOff x="0" y="0"/>
+          <a:chExt cx="0" cy="0"/>
+        </a:xfrm>
+      </p:grpSpPr>
+      <p:sp>
+        <p:nvSpPr>
+          <p:cNvPr id="2" name="Title 1"/>
+          <p:cNvSpPr>
+            <a:spLocks noGrp="1"/>
+          </p:cNvSpPr>
+          <p:nvPr>
+            <p:ph type="title"/>
+          </p:nvPr>
+        </p:nvSpPr>
+        <p:spPr/>
+        <p:txBody>
+          <a:bodyPr>
+            <a:normAutofit fontScale="90000"/>
+          </a:bodyPr>
+          <a:lstStyle/>
+          <a:p>
+            <a:r>
+              <a:rPr lang="en-US" dirty="0" smtClean="0"/>
+              <a:t>Differences between Phases 1 &amp;2</a:t>
+            </a:r>
+            <a:endParaRPr lang="en-NZ" dirty="0"/>
+          </a:p>
+        </p:txBody>
+      </p:sp>
+      <p:sp>
+        <p:nvSpPr>
+          <p:cNvPr id="3" name="Content Placeholder 2"/>
+          <p:cNvSpPr>
+            <a:spLocks noGrp="1"/>
+          </p:cNvSpPr>
+          <p:nvPr>
+            <p:ph idx="1"/>
+          </p:nvPr>
+        </p:nvSpPr>
+        <p:spPr/>
+        <p:txBody>
+          <a:bodyPr/>
+          <a:lstStyle/>
+          <a:p>
+            <a:endParaRPr lang="en-NZ" dirty="0"/>
+          </a:p>
+        </p:txBody>
+      </p:sp>
+    </p:spTree>
+    <p:extLst>
+      <p:ext uri="{BB962C8B-B14F-4D97-AF65-F5344CB8AC3E}">
+        <p14:creationId xmlns:p14="http://schemas.microsoft.com/office/powerpoint/2010/main" val="1916433675"/>
+      </p:ext>
+    </p:extLst>
+  </p:cSld>
+  <p:clrMapOvr>
+    <a:masterClrMapping/>
+  </p:clrMapOvr>
+</p:sld>
+</file>
+
+<file path=ppt/slides/slide3.xml><?xml version="1.0" encoding="utf-8"?>
+<p:sld xmlns:a="http://schemas.openxmlformats.org/drawingml/2006/main" xmlns:r="http://schemas.openxmlformats.org/officeDocument/2006/relationships" xmlns:p="http://schemas.openxmlformats.org/presentationml/2006/main">
+  <p:cSld>
+    <p:spTree>
+      <p:nvGrpSpPr>
+        <p:cNvPr id="1" name=""/>
+        <p:cNvGrpSpPr/>
+        <p:nvPr/>
+      </p:nvGrpSpPr>
+      <p:grpSpPr>
+        <a:xfrm>
+          <a:off x="0" y="0"/>
+          <a:ext cx="0" cy="0"/>
+          <a:chOff x="0" y="0"/>
+          <a:chExt cx="0" cy="0"/>
+        </a:xfrm>
+      </p:grpSpPr>
+      <p:sp>
+        <p:nvSpPr>
+          <p:cNvPr id="2" name="Title 1"/>
+          <p:cNvSpPr>
+            <a:spLocks noGrp="1"/>
+          </p:cNvSpPr>
+          <p:nvPr>
+            <p:ph type="title"/>
+          </p:nvPr>
+        </p:nvSpPr>
+        <p:spPr/>
+        <p:txBody>
+          <a:bodyPr>
+            <a:normAutofit fontScale="90000"/>
+          </a:bodyPr>
+          <a:lstStyle/>
+          <a:p>
+            <a:r>
+              <a:rPr lang="en-US" dirty="0" smtClean="0"/>
+              <a:t>Differences between </a:t>
+            </a:r>
+            <a:r>
+              <a:rPr lang="en-US" dirty="0" err="1" smtClean="0"/>
+              <a:t>SystemC</a:t>
+            </a:r>
+            <a:r>
+              <a:rPr lang="en-US" dirty="0" smtClean="0"/>
+              <a:t> and VHDL</a:t>
+            </a:r>
+            <a:endParaRPr lang="en-NZ" dirty="0"/>
+          </a:p>
+        </p:txBody>
+      </p:sp>
+      <p:sp>
+        <p:nvSpPr>
+          <p:cNvPr id="3" name="Content Placeholder 2"/>
+          <p:cNvSpPr>
+            <a:spLocks noGrp="1"/>
+          </p:cNvSpPr>
+          <p:nvPr>
+            <p:ph idx="1"/>
+          </p:nvPr>
+        </p:nvSpPr>
+        <p:spPr/>
+        <p:txBody>
+          <a:bodyPr/>
+          <a:lstStyle/>
+          <a:p>
+            <a:endParaRPr lang="en-NZ" dirty="0"/>
+          </a:p>
+        </p:txBody>
+      </p:sp>
+    </p:spTree>
+    <p:extLst>
+      <p:ext uri="{BB962C8B-B14F-4D97-AF65-F5344CB8AC3E}">
+        <p14:creationId xmlns:p14="http://schemas.microsoft.com/office/powerpoint/2010/main" val="3753341240"/>
+      </p:ext>
+    </p:extLst>
+  </p:cSld>
+  <p:clrMapOvr>
+    <a:masterClrMapping/>
+  </p:clrMapOvr>
+</p:sld>
+</file>
+
+<file path=ppt/slides/slide4.xml><?xml version="1.0" encoding="utf-8"?>
+<p:sld xmlns:a="http://schemas.openxmlformats.org/drawingml/2006/main" xmlns:r="http://schemas.openxmlformats.org/officeDocument/2006/relationships" xmlns:p="http://schemas.openxmlformats.org/presentationml/2006/main">
+  <p:cSld>
+    <p:spTree>
+      <p:nvGrpSpPr>
+        <p:cNvPr id="1" name=""/>
+        <p:cNvGrpSpPr/>
+        <p:nvPr/>
+      </p:nvGrpSpPr>
+      <p:grpSpPr>
+        <a:xfrm>
+          <a:off x="0" y="0"/>
+          <a:ext cx="0" cy="0"/>
+          <a:chOff x="0" y="0"/>
+          <a:chExt cx="0" cy="0"/>
+        </a:xfrm>
+      </p:grpSpPr>
+      <p:sp>
+        <p:nvSpPr>
+          <p:cNvPr id="2" name="Title 1"/>
+          <p:cNvSpPr>
+            <a:spLocks noGrp="1"/>
+          </p:cNvSpPr>
+          <p:nvPr>
+            <p:ph type="title"/>
+          </p:nvPr>
+        </p:nvSpPr>
+        <p:spPr/>
+        <p:txBody>
+          <a:bodyPr/>
+          <a:lstStyle/>
+          <a:p>
+            <a:r>
+              <a:rPr lang="en-US" dirty="0" err="1" smtClean="0"/>
+              <a:t>Recop</a:t>
+            </a:r>
+            <a:r>
+              <a:rPr lang="en-US" dirty="0" smtClean="0"/>
+              <a:t> Capabilities</a:t>
+            </a:r>
+            <a:endParaRPr lang="en-NZ" dirty="0"/>
+          </a:p>
+        </p:txBody>
+      </p:sp>
+      <p:sp>
+        <p:nvSpPr>
+          <p:cNvPr id="3" name="Content Placeholder 2"/>
+          <p:cNvSpPr>
+            <a:spLocks noGrp="1"/>
+          </p:cNvSpPr>
+          <p:nvPr>
+            <p:ph idx="1"/>
+          </p:nvPr>
+        </p:nvSpPr>
+        <p:spPr/>
+        <p:txBody>
+          <a:bodyPr/>
+          <a:lstStyle/>
+          <a:p>
+            <a:r>
+              <a:rPr lang="en-US" dirty="0" smtClean="0"/>
+              <a:t>Instructions relating to the ring counter</a:t>
+            </a:r>
+          </a:p>
+          <a:p>
+            <a:pPr lvl="1"/>
+            <a:r>
+              <a:rPr lang="en-US" dirty="0" smtClean="0"/>
+              <a:t>Load, ALU operations, Jump </a:t>
+            </a:r>
+            <a:r>
+              <a:rPr lang="en-US" dirty="0" err="1" smtClean="0"/>
+              <a:t>etc</a:t>
+            </a:r>
+            <a:endParaRPr lang="en-US" dirty="0" smtClean="0"/>
+          </a:p>
+          <a:p>
+            <a:endParaRPr lang="en-NZ" dirty="0"/>
+          </a:p>
+        </p:txBody>
+      </p:sp>
+    </p:spTree>
+    <p:extLst>
+      <p:ext uri="{BB962C8B-B14F-4D97-AF65-F5344CB8AC3E}">
+        <p14:creationId xmlns:p14="http://schemas.microsoft.com/office/powerpoint/2010/main" val="2622890681"/>
+      </p:ext>
+    </p:extLst>
+  </p:cSld>
+  <p:clrMapOvr>
+    <a:masterClrMapping/>
+  </p:clrMapOvr>
+</p:sld>
+</file>
+
+<file path=ppt/slides/slide5.xml><?xml version="1.0" encoding="utf-8"?>
+<p:sld xmlns:a="http://schemas.openxmlformats.org/drawingml/2006/main" xmlns:r="http://schemas.openxmlformats.org/officeDocument/2006/relationships" xmlns:p="http://schemas.openxmlformats.org/presentationml/2006/main">
+  <p:cSld>
+    <p:spTree>
+      <p:nvGrpSpPr>
+        <p:cNvPr id="1" name=""/>
+        <p:cNvGrpSpPr/>
+        <p:nvPr/>
+      </p:nvGrpSpPr>
+      <p:grpSpPr>
+        <a:xfrm>
+          <a:off x="0" y="0"/>
+          <a:ext cx="0" cy="0"/>
+          <a:chOff x="0" y="0"/>
+          <a:chExt cx="0" cy="0"/>
+        </a:xfrm>
+      </p:grpSpPr>
+      <p:sp>
+        <p:nvSpPr>
+          <p:cNvPr id="2" name="Title 1"/>
+          <p:cNvSpPr>
+            <a:spLocks noGrp="1"/>
+          </p:cNvSpPr>
+          <p:nvPr>
+            <p:ph type="title"/>
+          </p:nvPr>
+        </p:nvSpPr>
+        <p:spPr/>
+        <p:txBody>
+          <a:bodyPr>
+            <a:normAutofit/>
+          </a:bodyPr>
+          <a:lstStyle/>
+          <a:p>
+            <a:r>
+              <a:rPr lang="en-US" dirty="0" err="1" smtClean="0"/>
+              <a:t>Recop</a:t>
+            </a:r>
+            <a:r>
+              <a:rPr lang="en-US" dirty="0" smtClean="0"/>
+              <a:t> </a:t>
+            </a:r>
+            <a:r>
+              <a:rPr lang="en-US" dirty="0" err="1" smtClean="0"/>
+              <a:t>Incapabilities</a:t>
+            </a:r>
+            <a:endParaRPr lang="en-NZ" dirty="0"/>
+          </a:p>
+        </p:txBody>
+      </p:sp>
+      <p:sp>
+        <p:nvSpPr>
+          <p:cNvPr id="3" name="Content Placeholder 2"/>
+          <p:cNvSpPr>
+            <a:spLocks noGrp="1"/>
+          </p:cNvSpPr>
+          <p:nvPr>
+            <p:ph idx="1"/>
+          </p:nvPr>
+        </p:nvSpPr>
+        <p:spPr/>
+        <p:txBody>
+          <a:bodyPr/>
+          <a:lstStyle/>
+          <a:p>
+            <a:r>
+              <a:rPr lang="en-US" dirty="0" smtClean="0"/>
+              <a:t>Unable to complete data calls</a:t>
+            </a:r>
+          </a:p>
+          <a:p>
+            <a:pPr lvl="1"/>
+            <a:r>
+              <a:rPr lang="en-US" dirty="0" smtClean="0"/>
+              <a:t>Blocking working to a certain degree</a:t>
+            </a:r>
+          </a:p>
+          <a:p>
+            <a:pPr lvl="1"/>
+            <a:r>
+              <a:rPr lang="en-US" dirty="0" smtClean="0"/>
+              <a:t>Non Blocking not quite implemented</a:t>
+            </a:r>
+            <a:endParaRPr lang="en-NZ" dirty="0"/>
+          </a:p>
+        </p:txBody>
+      </p:sp>
+    </p:spTree>
+    <p:extLst>
+      <p:ext uri="{BB962C8B-B14F-4D97-AF65-F5344CB8AC3E}">
+        <p14:creationId xmlns:p14="http://schemas.microsoft.com/office/powerpoint/2010/main" val="2060475138"/>
+      </p:ext>
+    </p:extLst>
+  </p:cSld>
+  <p:clrMapOvr>
+    <a:masterClrMapping/>
+  </p:clrMapOvr>
+</p:sld>
+</file>
+
+<file path=ppt/slides/slide6.xml><?xml version="1.0" encoding="utf-8"?>
+<p:sld xmlns:a="http://schemas.openxmlformats.org/drawingml/2006/main" xmlns:r="http://schemas.openxmlformats.org/officeDocument/2006/relationships" xmlns:p="http://schemas.openxmlformats.org/presentationml/2006/main">
+  <p:cSld>
+    <p:spTree>
+      <p:nvGrpSpPr>
+        <p:cNvPr id="1" name=""/>
+        <p:cNvGrpSpPr/>
+        <p:nvPr/>
+      </p:nvGrpSpPr>
+      <p:grpSpPr>
+        <a:xfrm>
+          <a:off x="0" y="0"/>
+          <a:ext cx="0" cy="0"/>
+          <a:chOff x="0" y="0"/>
+          <a:chExt cx="0" cy="0"/>
+        </a:xfrm>
+      </p:grpSpPr>
+      <p:sp>
+        <p:nvSpPr>
+          <p:cNvPr id="2" name="Title 1"/>
+          <p:cNvSpPr>
+            <a:spLocks noGrp="1"/>
+          </p:cNvSpPr>
+          <p:nvPr>
+            <p:ph type="title"/>
+          </p:nvPr>
+        </p:nvSpPr>
+        <p:spPr/>
+        <p:txBody>
+          <a:bodyPr/>
+          <a:lstStyle/>
+          <a:p>
+            <a:r>
+              <a:rPr lang="en-US" dirty="0" smtClean="0"/>
+              <a:t>Ring Counter Simulation Results</a:t>
+            </a:r>
+            <a:endParaRPr lang="en-NZ" dirty="0"/>
+          </a:p>
+        </p:txBody>
+      </p:sp>
+      <p:sp>
+        <p:nvSpPr>
+          <p:cNvPr id="3" name="Content Placeholder 2"/>
+          <p:cNvSpPr>
+            <a:spLocks noGrp="1"/>
+          </p:cNvSpPr>
+          <p:nvPr>
+            <p:ph idx="1"/>
+          </p:nvPr>
+        </p:nvSpPr>
+        <p:spPr/>
+        <p:txBody>
+          <a:bodyPr/>
+          <a:lstStyle/>
+          <a:p>
+            <a:endParaRPr lang="en-NZ"/>
+          </a:p>
+        </p:txBody>
+      </p:sp>
+    </p:spTree>
+    <p:extLst>
+      <p:ext uri="{BB962C8B-B14F-4D97-AF65-F5344CB8AC3E}">
+        <p14:creationId xmlns:p14="http://schemas.microsoft.com/office/powerpoint/2010/main" val="2905183933"/>
+      </p:ext>
+    </p:extLst>
+  </p:cSld>
+  <p:clrMapOvr>
+    <a:masterClrMapping/>
+  </p:clrMapOvr>
+</p:sld>
+</file>
+
+<file path=ppt/slides/slide7.xml><?xml version="1.0" encoding="utf-8"?>
+<p:sld xmlns:a="http://schemas.openxmlformats.org/drawingml/2006/main" xmlns:r="http://schemas.openxmlformats.org/officeDocument/2006/relationships" xmlns:p="http://schemas.openxmlformats.org/presentationml/2006/main">
+  <p:cSld>
+    <p:spTree>
+      <p:nvGrpSpPr>
+        <p:cNvPr id="1" name=""/>
+        <p:cNvGrpSpPr/>
+        <p:nvPr/>
+      </p:nvGrpSpPr>
+      <p:grpSpPr>
+        <a:xfrm>
+          <a:off x="0" y="0"/>
+          <a:ext cx="0" cy="0"/>
+          <a:chOff x="0" y="0"/>
+          <a:chExt cx="0" cy="0"/>
+        </a:xfrm>
+      </p:grpSpPr>
+      <p:sp>
+        <p:nvSpPr>
+          <p:cNvPr id="2" name="Title 1"/>
+          <p:cNvSpPr>
+            <a:spLocks noGrp="1"/>
+          </p:cNvSpPr>
+          <p:nvPr>
+            <p:ph type="title"/>
+          </p:nvPr>
+        </p:nvSpPr>
+        <p:spPr/>
+        <p:txBody>
+          <a:bodyPr>
+            <a:normAutofit/>
+          </a:bodyPr>
+          <a:lstStyle/>
+          <a:p>
+            <a:r>
+              <a:rPr lang="en-US" dirty="0" smtClean="0"/>
+              <a:t>Ring Counter Synthesis </a:t>
+            </a:r>
+            <a:r>
+              <a:rPr lang="en-US" dirty="0" smtClean="0"/>
+              <a:t>Results</a:t>
+            </a:r>
+            <a:endParaRPr lang="en-NZ" dirty="0"/>
+          </a:p>
+        </p:txBody>
+      </p:sp>
+      <p:sp>
+        <p:nvSpPr>
+          <p:cNvPr id="3" name="Content Placeholder 2"/>
+          <p:cNvSpPr>
+            <a:spLocks noGrp="1"/>
+          </p:cNvSpPr>
+          <p:nvPr>
+            <p:ph idx="1"/>
+          </p:nvPr>
+        </p:nvSpPr>
+        <p:spPr/>
+        <p:txBody>
+          <a:bodyPr/>
+          <a:lstStyle/>
+          <a:p>
+            <a:r>
+              <a:rPr lang="en-US" dirty="0" smtClean="0"/>
+              <a:t>Resource Usage Count</a:t>
+            </a:r>
+          </a:p>
+          <a:p>
+            <a:pPr lvl="1"/>
+            <a:r>
+              <a:rPr lang="en-US" dirty="0" smtClean="0"/>
+              <a:t>LEs</a:t>
+            </a:r>
+          </a:p>
+          <a:p>
+            <a:pPr lvl="2"/>
+            <a:r>
+              <a:rPr lang="en-US" dirty="0" smtClean="0"/>
+              <a:t>852</a:t>
+            </a:r>
+            <a:endParaRPr lang="en-NZ" dirty="0" smtClean="0"/>
+          </a:p>
+          <a:p>
+            <a:r>
+              <a:rPr lang="en-US" dirty="0" smtClean="0"/>
+              <a:t>Maximum Operating Frequency</a:t>
+            </a:r>
+          </a:p>
+        </p:txBody>
+      </p:sp>
+    </p:spTree>
+    <p:extLst>
+      <p:ext uri="{BB962C8B-B14F-4D97-AF65-F5344CB8AC3E}">
+        <p14:creationId xmlns:p14="http://schemas.microsoft.com/office/powerpoint/2010/main" val="3822034495"/>
+      </p:ext>
+    </p:extLst>
+  </p:cSld>
+  <p:clrMapOvr>
+    <a:masterClrMapping/>
+  </p:clrMapOvr>
+  <p:timing>
+    <p:tnLst>
+      <p:par>
+        <p:cTn id="1" dur="indefinite" restart="never" nodeType="tmRoot"/>
+      </p:par>
+    </p:tnLst>
+  </p:timing>
+</p:sld>
+</file>
+
+<file path=ppt/slides/slide8.xml><?xml version="1.0" encoding="utf-8"?>
+<p:sld xmlns:a="http://schemas.openxmlformats.org/drawingml/2006/main" xmlns:r="http://schemas.openxmlformats.org/officeDocument/2006/relationships" xmlns:p="http://schemas.openxmlformats.org/presentationml/2006/main">
+  <p:cSld>
+    <p:spTree>
+      <p:nvGrpSpPr>
+        <p:cNvPr id="1" name=""/>
+        <p:cNvGrpSpPr/>
+        <p:nvPr/>
+      </p:nvGrpSpPr>
+      <p:grpSpPr>
+        <a:xfrm>
+          <a:off x="0" y="0"/>
+          <a:ext cx="0" cy="0"/>
+          <a:chOff x="0" y="0"/>
+          <a:chExt cx="0" cy="0"/>
+        </a:xfrm>
+      </p:grpSpPr>
+      <p:sp>
+        <p:nvSpPr>
+          <p:cNvPr id="2" name="Title 1"/>
+          <p:cNvSpPr>
+            <a:spLocks noGrp="1"/>
+          </p:cNvSpPr>
+          <p:nvPr>
+            <p:ph type="title"/>
+          </p:nvPr>
+        </p:nvSpPr>
+        <p:spPr/>
+        <p:txBody>
+          <a:bodyPr/>
+          <a:lstStyle/>
+          <a:p>
+            <a:r>
+              <a:rPr lang="en-US" dirty="0" smtClean="0"/>
+              <a:t>Blocking Data Call Simulation</a:t>
+            </a:r>
+            <a:endParaRPr lang="en-NZ" dirty="0"/>
+          </a:p>
+        </p:txBody>
+      </p:sp>
+      <p:pic>
+        <p:nvPicPr>
+          <p:cNvPr id="1026" name="Picture 2"/>
+          <p:cNvPicPr>
+            <a:picLocks noChangeAspect="1" noChangeArrowheads="1"/>
+          </p:cNvPicPr>
+          <p:nvPr/>
+        </p:nvPicPr>
+        <p:blipFill>
+          <a:blip r:embed="rId2">
+            <a:extLst>
+              <a:ext uri="{28A0092B-C50C-407E-A947-70E740481C1C}">
+                <a14:useLocalDpi xmlns:a14="http://schemas.microsoft.com/office/drawing/2010/main" val="0"/>
+              </a:ext>
+            </a:extLst>
+          </a:blip>
+          <a:srcRect/>
+          <a:stretch>
+            <a:fillRect/>
+          </a:stretch>
+        </p:blipFill>
+        <p:spPr bwMode="auto">
+          <a:xfrm>
+            <a:off x="152400" y="2133600"/>
+            <a:ext cx="8793290" cy="3276600"/>
+          </a:xfrm>
+          <a:prstGeom prst="rect">
+            <a:avLst/>
+          </a:prstGeom>
+          <a:noFill/>
+          <a:ln>
+            <a:noFill/>
+          </a:ln>
+          <a:extLst>
+            <a:ext uri="{909E8E84-426E-40DD-AFC4-6F175D3DCCD1}">
+              <a14:hiddenFill xmlns:a14="http://schemas.microsoft.com/office/drawing/2010/main">
+                <a:solidFill>
+                  <a:schemeClr val="accent1"/>
+                </a:solidFill>
+              </a14:hiddenFill>
+            </a:ext>
+            <a:ext uri="{91240B29-F687-4F45-9708-019B960494DF}">
+              <a14:hiddenLine xmlns:a14="http://schemas.microsoft.com/office/drawing/2010/main" w="9525">
+                <a:solidFill>
+                  <a:schemeClr val="tx1"/>
+                </a:solidFill>
+                <a:miter lim="800000"/>
+                <a:headEnd/>
+                <a:tailEnd/>
+              </a14:hiddenLine>
+            </a:ext>
+          </a:extLst>
+        </p:spPr>
+      </p:pic>
+      <p:sp>
+        <p:nvSpPr>
+          <p:cNvPr id="3" name="Content Placeholder 2"/>
+          <p:cNvSpPr>
+            <a:spLocks noGrp="1"/>
+          </p:cNvSpPr>
+          <p:nvPr>
+            <p:ph idx="1"/>
+          </p:nvPr>
+        </p:nvSpPr>
+        <p:spPr/>
+        <p:txBody>
+          <a:bodyPr/>
+          <a:lstStyle/>
+          <a:p>
+            <a:endParaRPr lang="en-NZ" dirty="0"/>
+          </a:p>
+        </p:txBody>
+      </p:sp>
+    </p:spTree>
+    <p:extLst>
+      <p:ext uri="{BB962C8B-B14F-4D97-AF65-F5344CB8AC3E}">
+        <p14:creationId xmlns:p14="http://schemas.microsoft.com/office/powerpoint/2010/main" val="1426433349"/>
+      </p:ext>
+    </p:extLst>
+  </p:cSld>
+  <p:clrMapOvr>
+    <a:masterClrMapping/>
+  </p:clrMapOvr>
+  <p:timing>
+    <p:tnLst>
+      <p:par>
+        <p:cTn id="1" dur="indefinite" restart="never" nodeType="tmRoot"/>
+      </p:par>
+    </p:tnLst>
+  </p:timing>
+</p:sld>
+</file>
+
+<file path=ppt/slides/slide9.xml><?xml version="1.0" encoding="utf-8"?>
+<p:sld xmlns:a="http://schemas.openxmlformats.org/drawingml/2006/main" xmlns:r="http://schemas.openxmlformats.org/officeDocument/2006/relationships" xmlns:p="http://schemas.openxmlformats.org/presentationml/2006/main">
+  <p:cSld>
+    <p:spTree>
+      <p:nvGrpSpPr>
+        <p:cNvPr id="1" name=""/>
+        <p:cNvGrpSpPr/>
+        <p:nvPr/>
+      </p:nvGrpSpPr>
+      <p:grpSpPr>
+        <a:xfrm>
+          <a:off x="0" y="0"/>
+          <a:ext cx="0" cy="0"/>
+          <a:chOff x="0" y="0"/>
+          <a:chExt cx="0" cy="0"/>
+        </a:xfrm>
+      </p:grpSpPr>
+      <p:sp>
+        <p:nvSpPr>
+          <p:cNvPr id="2" name="Title 1"/>
+          <p:cNvSpPr>
+            <a:spLocks noGrp="1"/>
+          </p:cNvSpPr>
+          <p:nvPr>
+            <p:ph type="title"/>
+          </p:nvPr>
+        </p:nvSpPr>
+        <p:spPr/>
+        <p:txBody>
+          <a:bodyPr/>
+          <a:lstStyle/>
+          <a:p>
+            <a:r>
+              <a:rPr lang="en-US" dirty="0" smtClean="0"/>
+              <a:t>Blocking Call Synthesis Results</a:t>
+            </a:r>
+            <a:endParaRPr lang="en-NZ" dirty="0"/>
+          </a:p>
+        </p:txBody>
+      </p:sp>
+      <p:sp>
+        <p:nvSpPr>
+          <p:cNvPr id="3" name="Content Placeholder 2"/>
+          <p:cNvSpPr>
+            <a:spLocks noGrp="1"/>
+          </p:cNvSpPr>
+          <p:nvPr>
+            <p:ph idx="1"/>
+          </p:nvPr>
+        </p:nvSpPr>
+        <p:spPr/>
+        <p:txBody>
+          <a:bodyPr/>
+          <a:lstStyle/>
+          <a:p>
+            <a:endParaRPr lang="en-NZ"/>
+          </a:p>
+        </p:txBody>
+      </p:sp>
+    </p:spTree>
+    <p:extLst>
+      <p:ext uri="{BB962C8B-B14F-4D97-AF65-F5344CB8AC3E}">
+        <p14:creationId xmlns:p14="http://schemas.microsoft.com/office/powerpoint/2010/main" val="2921614482"/>
       </p:ext>
     </p:extLst>
   </p:cSld>

</xml_diff>